<commit_message>
Updating RMarkdown Report and Presentation
</commit_message>
<xml_diff>
--- a/Exploratory_Analysis/reports/Overview-Presentation.pptx
+++ b/Exploratory_Analysis/reports/Overview-Presentation.pptx
@@ -9,6 +9,11 @@
     <p:sldId id="257" r:id="rId3"/>
     <p:sldId id="258" r:id="rId4"/>
     <p:sldId id="259" r:id="rId5"/>
+    <p:sldId id="260" r:id="rId6"/>
+    <p:sldId id="261" r:id="rId7"/>
+    <p:sldId id="262" r:id="rId8"/>
+    <p:sldId id="263" r:id="rId9"/>
+    <p:sldId id="264" r:id="rId10"/>
   </p:sldIdLst>
   <p:sldSz cx="12192000" cy="6858000"/>
   <p:notesSz cx="6858000" cy="9144000"/>
@@ -144,8 +149,8 @@
         </p:nvSpPr>
         <p:spPr>
           <a:xfrm>
-            <a:off x="1524000" y="1122363"/>
-            <a:ext cx="9144000" cy="2387600"/>
+            <a:off x="1028700" y="1122363"/>
+            <a:ext cx="10325100" cy="2387600"/>
           </a:xfrm>
         </p:spPr>
         <p:txBody>
@@ -160,7 +165,7 @@
               <a:rPr lang="en-US" smtClean="0"/>
               <a:t>Click to edit Master title style</a:t>
             </a:r>
-            <a:endParaRPr lang="en-GB"/>
+            <a:endParaRPr lang="en-GB" dirty="0"/>
           </a:p>
         </p:txBody>
       </p:sp>
@@ -176,8 +181,8 @@
         </p:nvSpPr>
         <p:spPr>
           <a:xfrm>
-            <a:off x="1524000" y="3602038"/>
-            <a:ext cx="9144000" cy="1655762"/>
+            <a:off x="1028700" y="3602038"/>
+            <a:ext cx="10325100" cy="1655762"/>
           </a:xfrm>
         </p:spPr>
         <p:txBody>
@@ -222,10 +227,10 @@
           </a:lstStyle>
           <a:p>
             <a:r>
-              <a:rPr lang="en-US" smtClean="0"/>
+              <a:rPr lang="en-US" dirty="0" smtClean="0"/>
               <a:t>Click to edit Master subtitle style</a:t>
             </a:r>
-            <a:endParaRPr lang="en-GB"/>
+            <a:endParaRPr lang="en-GB" dirty="0"/>
           </a:p>
         </p:txBody>
       </p:sp>
@@ -686,14 +691,20 @@
         </p:nvSpPr>
         <p:spPr/>
         <p:txBody>
-          <a:bodyPr/>
-          <a:lstStyle/>
-          <a:p>
-            <a:r>
-              <a:rPr lang="en-US" smtClean="0"/>
+          <a:bodyPr>
+            <a:normAutofit/>
+          </a:bodyPr>
+          <a:lstStyle>
+            <a:lvl1pPr>
+              <a:defRPr sz="3200" b="1"/>
+            </a:lvl1pPr>
+          </a:lstStyle>
+          <a:p>
+            <a:r>
+              <a:rPr lang="en-US" dirty="0" smtClean="0"/>
               <a:t>Click to edit Master title style</a:t>
             </a:r>
-            <a:endParaRPr lang="en-GB"/>
+            <a:endParaRPr lang="en-GB" dirty="0"/>
           </a:p>
         </p:txBody>
       </p:sp>
@@ -732,35 +743,35 @@
           <a:p>
             <a:pPr lvl="0"/>
             <a:r>
-              <a:rPr lang="en-US" dirty="0" smtClean="0"/>
+              <a:rPr lang="en-US" smtClean="0"/>
               <a:t>Click to edit Master text styles</a:t>
             </a:r>
           </a:p>
           <a:p>
             <a:pPr lvl="1"/>
             <a:r>
-              <a:rPr lang="en-US" dirty="0" smtClean="0"/>
+              <a:rPr lang="en-US" smtClean="0"/>
               <a:t>Second level</a:t>
             </a:r>
           </a:p>
           <a:p>
             <a:pPr lvl="2"/>
             <a:r>
-              <a:rPr lang="en-US" dirty="0" smtClean="0"/>
+              <a:rPr lang="en-US" smtClean="0"/>
               <a:t>Third level</a:t>
             </a:r>
           </a:p>
           <a:p>
             <a:pPr lvl="3"/>
             <a:r>
-              <a:rPr lang="en-US" dirty="0" smtClean="0"/>
+              <a:rPr lang="en-US" smtClean="0"/>
               <a:t>Fourth level</a:t>
             </a:r>
           </a:p>
           <a:p>
             <a:pPr lvl="4"/>
             <a:r>
-              <a:rPr lang="en-US" dirty="0" smtClean="0"/>
+              <a:rPr lang="en-US" smtClean="0"/>
               <a:t>Fifth level</a:t>
             </a:r>
             <a:endParaRPr lang="en-GB" dirty="0"/>
@@ -874,14 +885,27 @@
         </p:nvSpPr>
         <p:spPr/>
         <p:txBody>
-          <a:bodyPr/>
-          <a:lstStyle/>
-          <a:p>
-            <a:r>
-              <a:rPr lang="en-US" smtClean="0"/>
+          <a:bodyPr>
+            <a:normAutofit/>
+          </a:bodyPr>
+          <a:lstStyle>
+            <a:lvl1pPr>
+              <a:defRPr lang="en-GB" sz="3200" b="1" kern="1200" dirty="0">
+                <a:solidFill>
+                  <a:schemeClr val="tx1"/>
+                </a:solidFill>
+                <a:latin typeface="+mj-lt"/>
+                <a:ea typeface="+mj-ea"/>
+                <a:cs typeface="+mj-cs"/>
+              </a:defRPr>
+            </a:lvl1pPr>
+          </a:lstStyle>
+          <a:p>
+            <a:r>
+              <a:rPr lang="en-US" dirty="0" smtClean="0"/>
               <a:t>Click to edit Master title style</a:t>
             </a:r>
-            <a:endParaRPr lang="en-GB"/>
+            <a:endParaRPr lang="en-GB" dirty="0"/>
           </a:p>
         </p:txBody>
       </p:sp>
@@ -1011,7 +1035,7 @@
               <a:rPr lang="en-US" smtClean="0"/>
               <a:t>Click icon to add picture</a:t>
             </a:r>
-            <a:endParaRPr lang="en-GB"/>
+            <a:endParaRPr lang="en-GB" dirty="0"/>
           </a:p>
         </p:txBody>
       </p:sp>
@@ -1137,7 +1161,7 @@
           </a:xfrm>
         </p:spPr>
         <p:txBody>
-          <a:bodyPr anchor="b"/>
+          <a:bodyPr anchor="ctr"/>
           <a:lstStyle>
             <a:lvl1pPr>
               <a:defRPr sz="6000"/>
@@ -1169,11 +1193,13 @@
           </a:xfrm>
         </p:spPr>
         <p:txBody>
-          <a:bodyPr/>
+          <a:bodyPr>
+            <a:normAutofit/>
+          </a:bodyPr>
           <a:lstStyle>
             <a:lvl1pPr marL="0" indent="0">
               <a:buNone/>
-              <a:defRPr sz="2400">
+              <a:defRPr sz="2000">
                 <a:solidFill>
                   <a:schemeClr val="tx1">
                     <a:tint val="75000"/>
@@ -1382,10 +1408,10 @@
           <a:lstStyle/>
           <a:p>
             <a:r>
-              <a:rPr lang="en-US" smtClean="0"/>
+              <a:rPr lang="en-US" dirty="0" smtClean="0"/>
               <a:t>Click to edit Master title style</a:t>
             </a:r>
-            <a:endParaRPr lang="en-GB"/>
+            <a:endParaRPr lang="en-GB" dirty="0"/>
           </a:p>
         </p:txBody>
       </p:sp>
@@ -1442,7 +1468,7 @@
               <a:rPr lang="en-US" smtClean="0"/>
               <a:t>Fifth level</a:t>
             </a:r>
-            <a:endParaRPr lang="en-GB"/>
+            <a:endParaRPr lang="en-GB" dirty="0"/>
           </a:p>
         </p:txBody>
       </p:sp>
@@ -1499,7 +1525,7 @@
               <a:rPr lang="en-US" smtClean="0"/>
               <a:t>Fifth level</a:t>
             </a:r>
-            <a:endParaRPr lang="en-GB"/>
+            <a:endParaRPr lang="en-GB" dirty="0"/>
           </a:p>
         </p:txBody>
       </p:sp>
@@ -1622,7 +1648,7 @@
               <a:rPr lang="en-US" smtClean="0"/>
               <a:t>Click to edit Master title style</a:t>
             </a:r>
-            <a:endParaRPr lang="en-GB"/>
+            <a:endParaRPr lang="en-GB" dirty="0"/>
           </a:p>
         </p:txBody>
       </p:sp>
@@ -2109,11 +2135,11 @@
         <p:spPr>
           <a:xfrm>
             <a:off x="839788" y="457200"/>
-            <a:ext cx="3932237" cy="1600200"/>
+            <a:ext cx="10514012" cy="1600200"/>
           </a:xfrm>
         </p:spPr>
         <p:txBody>
-          <a:bodyPr anchor="b"/>
+          <a:bodyPr anchor="ctr"/>
           <a:lstStyle>
             <a:lvl1pPr>
               <a:defRPr sz="3200"/>
@@ -2121,10 +2147,10 @@
           </a:lstStyle>
           <a:p>
             <a:r>
-              <a:rPr lang="en-US" smtClean="0"/>
+              <a:rPr lang="en-US" dirty="0" smtClean="0"/>
               <a:t>Click to edit Master title style</a:t>
             </a:r>
-            <a:endParaRPr lang="en-GB"/>
+            <a:endParaRPr lang="en-GB" dirty="0"/>
           </a:p>
         </p:txBody>
       </p:sp>
@@ -2140,21 +2166,23 @@
         </p:nvSpPr>
         <p:spPr>
           <a:xfrm>
-            <a:off x="5183188" y="987425"/>
-            <a:ext cx="6172200" cy="4873625"/>
+            <a:off x="836612" y="2823210"/>
+            <a:ext cx="10517188" cy="3140710"/>
           </a:xfrm>
         </p:spPr>
         <p:txBody>
-          <a:bodyPr/>
+          <a:bodyPr>
+            <a:normAutofit/>
+          </a:bodyPr>
           <a:lstStyle>
             <a:lvl1pPr>
-              <a:defRPr sz="3200"/>
+              <a:defRPr sz="2000"/>
             </a:lvl1pPr>
             <a:lvl2pPr>
-              <a:defRPr sz="2800"/>
+              <a:defRPr sz="2000"/>
             </a:lvl2pPr>
             <a:lvl3pPr>
-              <a:defRPr sz="2400"/>
+              <a:defRPr sz="2000"/>
             </a:lvl3pPr>
             <a:lvl4pPr>
               <a:defRPr sz="2000"/>
@@ -2178,38 +2206,38 @@
           <a:p>
             <a:pPr lvl="0"/>
             <a:r>
-              <a:rPr lang="en-US" smtClean="0"/>
+              <a:rPr lang="en-US" dirty="0" smtClean="0"/>
               <a:t>Click to edit Master text styles</a:t>
             </a:r>
           </a:p>
           <a:p>
             <a:pPr lvl="1"/>
             <a:r>
-              <a:rPr lang="en-US" smtClean="0"/>
+              <a:rPr lang="en-US" dirty="0" smtClean="0"/>
               <a:t>Second level</a:t>
             </a:r>
           </a:p>
           <a:p>
             <a:pPr lvl="2"/>
             <a:r>
-              <a:rPr lang="en-US" smtClean="0"/>
+              <a:rPr lang="en-US" dirty="0" smtClean="0"/>
               <a:t>Third level</a:t>
             </a:r>
           </a:p>
           <a:p>
             <a:pPr lvl="3"/>
             <a:r>
-              <a:rPr lang="en-US" smtClean="0"/>
+              <a:rPr lang="en-US" dirty="0" smtClean="0"/>
               <a:t>Fourth level</a:t>
             </a:r>
           </a:p>
           <a:p>
             <a:pPr lvl="4"/>
             <a:r>
-              <a:rPr lang="en-US" smtClean="0"/>
+              <a:rPr lang="en-US" dirty="0" smtClean="0"/>
               <a:t>Fifth level</a:t>
             </a:r>
-            <a:endParaRPr lang="en-GB"/>
+            <a:endParaRPr lang="en-GB" dirty="0"/>
           </a:p>
         </p:txBody>
       </p:sp>
@@ -2226,15 +2254,17 @@
         <p:spPr>
           <a:xfrm>
             <a:off x="839788" y="2057400"/>
-            <a:ext cx="3932237" cy="3811588"/>
+            <a:ext cx="10514012" cy="3811588"/>
           </a:xfrm>
         </p:spPr>
         <p:txBody>
-          <a:bodyPr/>
+          <a:bodyPr>
+            <a:normAutofit/>
+          </a:bodyPr>
           <a:lstStyle>
             <a:lvl1pPr marL="0" indent="0">
               <a:buNone/>
-              <a:defRPr sz="1600"/>
+              <a:defRPr sz="2000"/>
             </a:lvl1pPr>
             <a:lvl2pPr marL="457200" indent="0">
               <a:buNone/>
@@ -2272,7 +2302,7 @@
           <a:p>
             <a:pPr lvl="0"/>
             <a:r>
-              <a:rPr lang="en-US" smtClean="0"/>
+              <a:rPr lang="en-US" dirty="0" smtClean="0"/>
               <a:t>Click to edit Master text styles</a:t>
             </a:r>
           </a:p>
@@ -2385,12 +2415,12 @@
         </p:nvSpPr>
         <p:spPr>
           <a:xfrm>
-            <a:off x="839788" y="457200"/>
-            <a:ext cx="3932237" cy="1600200"/>
+            <a:off x="838200" y="457200"/>
+            <a:ext cx="10515600" cy="1600200"/>
           </a:xfrm>
         </p:spPr>
         <p:txBody>
-          <a:bodyPr anchor="b"/>
+          <a:bodyPr anchor="ctr"/>
           <a:lstStyle>
             <a:lvl1pPr>
               <a:defRPr sz="3200"/>
@@ -2417,16 +2447,18 @@
         </p:nvSpPr>
         <p:spPr>
           <a:xfrm>
-            <a:off x="5183188" y="987425"/>
-            <a:ext cx="6172200" cy="4873625"/>
+            <a:off x="838200" y="2427605"/>
+            <a:ext cx="10515600" cy="3584575"/>
           </a:xfrm>
         </p:spPr>
         <p:txBody>
-          <a:bodyPr/>
+          <a:bodyPr>
+            <a:normAutofit/>
+          </a:bodyPr>
           <a:lstStyle>
             <a:lvl1pPr marL="0" indent="0">
               <a:buNone/>
-              <a:defRPr sz="3200"/>
+              <a:defRPr sz="2000"/>
             </a:lvl1pPr>
             <a:lvl2pPr marL="457200" indent="0">
               <a:buNone/>
@@ -2483,15 +2515,17 @@
         <p:spPr>
           <a:xfrm>
             <a:off x="839788" y="2057400"/>
-            <a:ext cx="3932237" cy="3811588"/>
+            <a:ext cx="10514012" cy="3811588"/>
           </a:xfrm>
         </p:spPr>
         <p:txBody>
-          <a:bodyPr/>
+          <a:bodyPr>
+            <a:normAutofit/>
+          </a:bodyPr>
           <a:lstStyle>
-            <a:lvl1pPr marL="0" indent="0">
-              <a:buNone/>
-              <a:defRPr sz="1600"/>
+            <a:lvl1pPr marL="0" indent="0" algn="l">
+              <a:buNone/>
+              <a:defRPr sz="2000"/>
             </a:lvl1pPr>
             <a:lvl2pPr marL="457200" indent="0">
               <a:buNone/>
@@ -2529,7 +2563,7 @@
           <a:p>
             <a:pPr lvl="0"/>
             <a:r>
-              <a:rPr lang="en-US" smtClean="0"/>
+              <a:rPr lang="en-US" dirty="0" smtClean="0"/>
               <a:t>Click to edit Master text styles</a:t>
             </a:r>
           </a:p>
@@ -2661,10 +2695,10 @@
           <a:lstStyle/>
           <a:p>
             <a:r>
-              <a:rPr lang="en-US" smtClean="0"/>
+              <a:rPr lang="en-US" dirty="0" smtClean="0"/>
               <a:t>Click to edit Master title style</a:t>
             </a:r>
-            <a:endParaRPr lang="en-GB"/>
+            <a:endParaRPr lang="en-GB" dirty="0"/>
           </a:p>
         </p:txBody>
       </p:sp>
@@ -2695,35 +2729,35 @@
           <a:p>
             <a:pPr lvl="0"/>
             <a:r>
-              <a:rPr lang="en-US" dirty="0" smtClean="0"/>
+              <a:rPr lang="en-US" smtClean="0"/>
               <a:t>Click to edit Master text styles</a:t>
             </a:r>
           </a:p>
           <a:p>
             <a:pPr lvl="1"/>
             <a:r>
-              <a:rPr lang="en-US" dirty="0" smtClean="0"/>
+              <a:rPr lang="en-US" smtClean="0"/>
               <a:t>Second level</a:t>
             </a:r>
           </a:p>
           <a:p>
             <a:pPr lvl="2"/>
             <a:r>
-              <a:rPr lang="en-US" dirty="0" smtClean="0"/>
+              <a:rPr lang="en-US" smtClean="0"/>
               <a:t>Third level</a:t>
             </a:r>
           </a:p>
           <a:p>
             <a:pPr lvl="3"/>
             <a:r>
-              <a:rPr lang="en-US" dirty="0" smtClean="0"/>
+              <a:rPr lang="en-US" smtClean="0"/>
               <a:t>Fourth level</a:t>
             </a:r>
           </a:p>
           <a:p>
             <a:pPr lvl="4"/>
             <a:r>
-              <a:rPr lang="en-US" dirty="0" smtClean="0"/>
+              <a:rPr lang="en-US" smtClean="0"/>
               <a:t>Fifth level</a:t>
             </a:r>
             <a:endParaRPr lang="en-GB" dirty="0"/>
@@ -2880,7 +2914,7 @@
           <a:spcPct val="0"/>
         </a:spcBef>
         <a:buNone/>
-        <a:defRPr sz="4400" kern="1200">
+        <a:defRPr sz="3200" b="1" kern="1200">
           <a:solidFill>
             <a:schemeClr val="tx1"/>
           </a:solidFill>
@@ -3182,8 +3216,8 @@
         </p:nvSpPr>
         <p:spPr>
           <a:xfrm>
-            <a:off x="1524000" y="1122363"/>
-            <a:ext cx="9144000" cy="2387600"/>
+            <a:off x="1028700" y="1122363"/>
+            <a:ext cx="10325100" cy="2387600"/>
           </a:xfrm>
         </p:spPr>
         <p:txBody>
@@ -3220,8 +3254,8 @@
         </p:nvSpPr>
         <p:spPr>
           <a:xfrm>
-            <a:off x="1524000" y="3602038"/>
-            <a:ext cx="9144000" cy="1655762"/>
+            <a:off x="1028700" y="3602038"/>
+            <a:ext cx="10325100" cy="1655762"/>
           </a:xfrm>
         </p:spPr>
         <p:txBody>
@@ -3344,17 +3378,19 @@
             </a:r>
           </a:p>
           <a:p>
+            <a:pPr lvl="0" marL="0" indent="0">
+              <a:buNone/>
+            </a:pPr>
+            <a:r>
+              <a:rPr/>
+              <a:t> </a:t>
+            </a:r>
+          </a:p>
+          <a:p>
             <a:pPr lvl="1"/>
             <a:r>
               <a:rPr/>
               <a:t>Looking at the data and deciding on an area of interest</a:t>
-            </a:r>
-          </a:p>
-          <a:p>
-            <a:pPr lvl="1"/>
-            <a:r>
-              <a:rPr/>
-              <a:t>Starting the analysis</a:t>
             </a:r>
           </a:p>
           <a:p>
@@ -3847,39 +3883,39 @@
             </a:pPr>
             <a:r>
               <a:rPr/>
-              <a:t>Still</a:t>
-            </a:r>
-            <a:r>
-              <a:rPr/>
-              <a:t> </a:t>
-            </a:r>
-            <a:r>
-              <a:rPr/>
-              <a:t>looking</a:t>
-            </a:r>
-            <a:r>
-              <a:rPr/>
-              <a:t> </a:t>
-            </a:r>
-            <a:r>
-              <a:rPr/>
-              <a:t>at</a:t>
-            </a:r>
-            <a:r>
-              <a:rPr/>
-              <a:t> </a:t>
-            </a:r>
-            <a:r>
-              <a:rPr/>
-              <a:t>the</a:t>
-            </a:r>
-            <a:r>
-              <a:rPr/>
-              <a:t> </a:t>
-            </a:r>
-            <a:r>
-              <a:rPr/>
-              <a:t>data</a:t>
+              <a:t>Deciding</a:t>
+            </a:r>
+            <a:r>
+              <a:rPr/>
+              <a:t> </a:t>
+            </a:r>
+            <a:r>
+              <a:rPr/>
+              <a:t>an</a:t>
+            </a:r>
+            <a:r>
+              <a:rPr/>
+              <a:t> </a:t>
+            </a:r>
+            <a:r>
+              <a:rPr/>
+              <a:t>area</a:t>
+            </a:r>
+            <a:r>
+              <a:rPr/>
+              <a:t> </a:t>
+            </a:r>
+            <a:r>
+              <a:rPr/>
+              <a:t>of</a:t>
+            </a:r>
+            <a:r>
+              <a:rPr/>
+              <a:t> </a:t>
+            </a:r>
+            <a:r>
+              <a:rPr/>
+              <a:t>interest</a:t>
             </a:r>
           </a:p>
         </p:txBody>
@@ -3904,69 +3940,686 @@
             </a:pPr>
             <a:r>
               <a:rPr/>
-              <a:t>I loaded sample data into RStudio and started looking at the data using R commands. It was possible to determine the size of the tables, the types of data that had been captured and see missing items. It was possible to determine the types of data that had been captured and see missing items.</a:t>
+              <a:t>I loaded sample data into RStudio and started looking at the data using R commands (head, summary, glimpse). It was possible to determine the size of the tables, the types of data that had been captured and see missing items. I decided to investigate students’ willingness to share personal data at enrolment, given that the course was related to security.</a:t>
             </a:r>
           </a:p>
           <a:p>
             <a:pPr lvl="0" marL="1270000" indent="0">
               <a:buNone/>
             </a:pPr>
-            <a:r>
-              <a:rPr sz="1800" b="1">
-                <a:solidFill>
-                  <a:srgbClr val="007020"/>
-                </a:solidFill>
-                <a:latin typeface="Courier"/>
-              </a:rPr>
-              <a:t>glimpse</a:t>
-            </a:r>
             <a:r>
               <a:rPr sz="1800">
                 <a:latin typeface="Courier"/>
               </a:rPr>
-              <a:t>(cyber.security</a:t>
-            </a:r>
-            <a:r>
-              <a:rPr sz="1800">
-                <a:solidFill>
-                  <a:srgbClr val="40A070"/>
-                </a:solidFill>
-                <a:latin typeface="Courier"/>
+              <a:t>## # A tibble: 1 x 4
+##   learner_id                         enrolled_at            unenrolled_at role  
+##   &lt;chr&gt;                              &lt;chr&gt;                  &lt;chr&gt;         &lt;chr&gt; 
+## 1 160d6600-ea0e-4568-bfa9-5d7cd5b8e~ 2016-08-10 14:28:49 U~ ""            learn~</a:t>
+            </a:r>
+          </a:p>
+        </p:txBody>
+      </p:sp>
+    </p:spTree>
+  </p:cSld>
+</p:sld>
+</file>
+
+<file path=ppt/slides/slide5.xml><?xml version="1.0" encoding="utf-8"?>
+<p:sld xmlns:a="http://schemas.openxmlformats.org/drawingml/2006/main" xmlns:r="http://schemas.openxmlformats.org/officeDocument/2006/relationships" xmlns:p="http://schemas.openxmlformats.org/presentationml/2006/main">
+  <p:cSld>
+    <p:spTree>
+      <p:nvGrpSpPr>
+        <p:cNvPr id="1" name=""/>
+        <p:cNvGrpSpPr/>
+        <p:nvPr/>
+      </p:nvGrpSpPr>
+      <p:grpSpPr>
+        <a:xfrm>
+          <a:off x="0" y="0"/>
+          <a:ext cx="0" cy="0"/>
+          <a:chOff x="0" y="0"/>
+          <a:chExt cx="0" cy="0"/>
+        </a:xfrm>
+      </p:grpSpPr>
+      <p:sp>
+        <p:nvSpPr>
+          <p:cNvPr id="2" name="Title 1"/>
+          <p:cNvSpPr>
+            <a:spLocks noGrp="1"/>
+          </p:cNvSpPr>
+          <p:nvPr>
+            <p:ph type="title"/>
+          </p:nvPr>
+        </p:nvSpPr>
+        <p:spPr/>
+        <p:txBody>
+          <a:bodyPr/>
+          <a:lstStyle/>
+          <a:p>
+            <a:pPr lvl="0" marL="0" indent="0">
+              <a:buNone/>
+            </a:pPr>
+            <a:r>
+              <a:rPr/>
+              <a:t>Using</a:t>
+            </a:r>
+            <a:r>
+              <a:rPr/>
+              <a:t> </a:t>
+            </a:r>
+            <a:r>
+              <a:rPr/>
+              <a:t>ProjectTemplate</a:t>
+            </a:r>
+          </a:p>
+        </p:txBody>
+      </p:sp>
+      <p:pic>
+        <p:nvPicPr>
+          <p:cNvPr descr="Images/ProjectTemplateScript.jpg" id="0" name="Picture 1"/>
+          <p:cNvPicPr>
+            <a:picLocks noGrp="1" noChangeAspect="1"/>
+          </p:cNvPicPr>
+          <p:nvPr/>
+        </p:nvPicPr>
+        <p:blipFill>
+          <a:blip r:embed="rId2"/>
+          <a:stretch>
+            <a:fillRect/>
+          </a:stretch>
+        </p:blipFill>
+        <p:spPr bwMode="auto">
+          <a:xfrm>
+            <a:off x="838200" y="2184400"/>
+            <a:ext cx="10515600" cy="3111500"/>
+          </a:xfrm>
+          <a:prstGeom prst="rect">
+            <a:avLst/>
+          </a:prstGeom>
+          <a:noFill/>
+          <a:ln w="9525">
+            <a:noFill/>
+            <a:headEnd/>
+            <a:tailEnd/>
+          </a:ln>
+        </p:spPr>
+      </p:pic>
+      <p:sp>
+        <p:nvSpPr>
+          <p:cNvPr id="1" name="TextBox 3"/>
+          <p:cNvSpPr txBox="1"/>
+          <p:nvPr/>
+        </p:nvSpPr>
+        <p:spPr>
+          <a:xfrm>
+            <a:off x="838200" y="5651500"/>
+            <a:ext cx="10515600" cy="508000"/>
+          </a:xfrm>
+          <a:prstGeom prst="rect">
+            <a:avLst/>
+          </a:prstGeom>
+          <a:noFill/>
+        </p:spPr>
+        <p:txBody>
+          <a:bodyPr/>
+          <a:lstStyle/>
+          <a:p>
+            <a:pPr lvl="0" marL="0" indent="0" algn="ctr">
+              <a:buNone/>
+            </a:pPr>
+            <a:r>
+              <a:rPr/>
+              <a:t>To</a:t>
+            </a:r>
+            <a:r>
+              <a:rPr/>
+              <a:t> </a:t>
+            </a:r>
+            <a:r>
+              <a:rPr/>
+              <a:t>generate</a:t>
+            </a:r>
+            <a:r>
+              <a:rPr/>
+              <a:t> </a:t>
+            </a:r>
+            <a:r>
+              <a:rPr/>
+              <a:t>the</a:t>
+            </a:r>
+            <a:r>
+              <a:rPr/>
+              <a:t> </a:t>
+            </a:r>
+            <a:r>
+              <a:rPr/>
+              <a:t>necessary</a:t>
+            </a:r>
+            <a:r>
+              <a:rPr/>
+              <a:t> </a:t>
+            </a:r>
+            <a:r>
+              <a:rPr/>
+              <a:t>folders</a:t>
+            </a:r>
+            <a:r>
+              <a:rPr/>
+              <a:t> </a:t>
+            </a:r>
+            <a:r>
+              <a:rPr/>
+              <a:t>for</a:t>
+            </a:r>
+            <a:r>
+              <a:rPr/>
+              <a:t> </a:t>
+            </a:r>
+            <a:r>
+              <a:rPr/>
+              <a:t>my</a:t>
+            </a:r>
+            <a:r>
+              <a:rPr/>
+              <a:t> </a:t>
+            </a:r>
+            <a:r>
+              <a:rPr/>
+              <a:t>work,</a:t>
+            </a:r>
+            <a:r>
+              <a:rPr/>
+              <a:t> </a:t>
+            </a:r>
+            <a:r>
+              <a:rPr/>
+              <a:t>organise</a:t>
+            </a:r>
+            <a:r>
+              <a:rPr/>
+              <a:t> </a:t>
+            </a:r>
+            <a:r>
+              <a:rPr/>
+              <a:t>the</a:t>
+            </a:r>
+            <a:r>
+              <a:rPr/>
+              <a:t> </a:t>
+            </a:r>
+            <a:r>
+              <a:rPr/>
+              <a:t>files,</a:t>
+            </a:r>
+            <a:r>
+              <a:rPr/>
+              <a:t> </a:t>
+            </a:r>
+            <a:r>
+              <a:rPr/>
+              <a:t>load</a:t>
+            </a:r>
+            <a:r>
+              <a:rPr/>
+              <a:t> </a:t>
+            </a:r>
+            <a:r>
+              <a:rPr/>
+              <a:t>the</a:t>
+            </a:r>
+            <a:r>
+              <a:rPr/>
+              <a:t> </a:t>
+            </a:r>
+            <a:r>
+              <a:rPr/>
+              <a:t>R</a:t>
+            </a:r>
+            <a:r>
+              <a:rPr/>
+              <a:t> </a:t>
+            </a:r>
+            <a:r>
+              <a:rPr/>
+              <a:t>packages</a:t>
+            </a:r>
+            <a:r>
+              <a:rPr/>
+              <a:t> </a:t>
+            </a:r>
+            <a:r>
+              <a:rPr/>
+              <a:t>and</a:t>
+            </a:r>
+            <a:r>
+              <a:rPr/>
+              <a:t> </a:t>
+            </a:r>
+            <a:r>
+              <a:rPr/>
+              <a:t>data</a:t>
+            </a:r>
+            <a:r>
+              <a:rPr/>
+              <a:t> </a:t>
+            </a:r>
+            <a:r>
+              <a:rPr/>
+              <a:t>sets</a:t>
+            </a:r>
+            <a:r>
+              <a:rPr/>
+              <a:t> </a:t>
+            </a:r>
+            <a:r>
+              <a:rPr/>
+              <a:t>into</a:t>
+            </a:r>
+            <a:r>
+              <a:rPr/>
+              <a:t> </a:t>
+            </a:r>
+            <a:r>
+              <a:rPr/>
+              <a:t>memory</a:t>
+            </a:r>
+            <a:r>
+              <a:rPr/>
+              <a:t> </a:t>
+            </a:r>
+            <a:r>
+              <a:rPr/>
+              <a:t>I</a:t>
+            </a:r>
+            <a:r>
+              <a:rPr/>
+              <a:t> </a:t>
+            </a:r>
+            <a:r>
+              <a:rPr/>
+              <a:t>ran</a:t>
+            </a:r>
+            <a:r>
+              <a:rPr/>
+              <a:t> </a:t>
+            </a:r>
+            <a:r>
+              <a:rPr/>
+              <a:t>the</a:t>
+            </a:r>
+            <a:r>
+              <a:rPr/>
+              <a:t> </a:t>
+            </a:r>
+            <a:r>
+              <a:rPr/>
+              <a:t>ProjectTemplate</a:t>
+            </a:r>
+            <a:r>
+              <a:rPr/>
+              <a:t> </a:t>
+            </a:r>
+            <a:r>
+              <a:rPr/>
+              <a:t>scripts</a:t>
+            </a:r>
+            <a:r>
+              <a:rPr/>
+              <a:t> </a:t>
+            </a:r>
+            <a:r>
+              <a:rPr/>
+              <a:t>above.</a:t>
+            </a:r>
+            <a:r>
+              <a:rPr/>
+              <a:t> </a:t>
+            </a:r>
+            <a:r>
+              <a:rPr/>
+              <a:t>For</a:t>
+            </a:r>
+            <a:r>
+              <a:rPr/>
+              <a:t> </a:t>
+            </a:r>
+            <a:r>
+              <a:rPr/>
+              <a:t>more</a:t>
+            </a:r>
+            <a:r>
+              <a:rPr/>
+              <a:t> </a:t>
+            </a:r>
+            <a:r>
+              <a:rPr/>
+              <a:t>details</a:t>
+            </a:r>
+            <a:r>
+              <a:rPr/>
+              <a:t> </a:t>
+            </a:r>
+            <a:r>
+              <a:rPr/>
+              <a:t>about</a:t>
+            </a:r>
+            <a:r>
+              <a:rPr/>
+              <a:t> </a:t>
+            </a:r>
+            <a:r>
+              <a:rPr/>
+              <a:t>ProjectTemplate,</a:t>
+            </a:r>
+            <a:r>
+              <a:rPr/>
+              <a:t> </a:t>
+            </a:r>
+            <a:r>
+              <a:rPr/>
+              <a:t>see</a:t>
+            </a:r>
+            <a:r>
+              <a:rPr/>
+              <a:t> </a:t>
+            </a:r>
+            <a:r>
+              <a:rPr>
+                <a:hlinkClick r:id="rId3"/>
               </a:rPr>
-              <a:t>.1</a:t>
-            </a:r>
-            <a:r>
-              <a:rPr sz="1800">
-                <a:latin typeface="Courier"/>
-              </a:rPr>
-              <a:t>_enrolments)</a:t>
-            </a:r>
-          </a:p>
-          <a:p>
-            <a:pPr lvl="0" marL="1270000" indent="0">
+              <a:t>http://projecttemplate.net</a:t>
+            </a:r>
+          </a:p>
+        </p:txBody>
+      </p:sp>
+    </p:spTree>
+  </p:cSld>
+</p:sld>
+</file>
+
+<file path=ppt/slides/slide6.xml><?xml version="1.0" encoding="utf-8"?>
+<p:sld xmlns:a="http://schemas.openxmlformats.org/drawingml/2006/main" xmlns:r="http://schemas.openxmlformats.org/officeDocument/2006/relationships" xmlns:p="http://schemas.openxmlformats.org/presentationml/2006/main">
+  <p:cSld>
+    <p:spTree>
+      <p:nvGrpSpPr>
+        <p:cNvPr id="1" name=""/>
+        <p:cNvGrpSpPr/>
+        <p:nvPr/>
+      </p:nvGrpSpPr>
+      <p:grpSpPr>
+        <a:xfrm>
+          <a:off x="0" y="0"/>
+          <a:ext cx="0" cy="0"/>
+          <a:chOff x="0" y="0"/>
+          <a:chExt cx="0" cy="0"/>
+        </a:xfrm>
+      </p:grpSpPr>
+      <p:sp>
+        <p:nvSpPr>
+          <p:cNvPr id="2" name="Title 1"/>
+          <p:cNvSpPr>
+            <a:spLocks noGrp="1"/>
+          </p:cNvSpPr>
+          <p:nvPr>
+            <p:ph type="title"/>
+          </p:nvPr>
+        </p:nvSpPr>
+        <p:spPr/>
+        <p:txBody>
+          <a:bodyPr/>
+          <a:lstStyle/>
+          <a:p>
+            <a:pPr lvl="0" marL="0" indent="0">
               <a:buNone/>
             </a:pPr>
             <a:r>
-              <a:rPr sz="1800">
-                <a:latin typeface="Courier"/>
-              </a:rPr>
-              <a:t>## Rows: 14,394
-## Columns: 15
-## $ learner_id              &lt;chr&gt; "160d6600-ea0e-4568-bfa9-5d7cd5b8e61b", "4d...
-## $ enrolled_at             &lt;chr&gt; "2016-08-10 14:28:49 UTC", "2016-05-24 17:3...
-## $ unenrolled_at           &lt;chr&gt; "", "2018-10-30 20:20:51 UTC", "", "", "", ...
-## $ role                    &lt;chr&gt; "learner", "learner", "learner", "learner",...
-## $ fully_participated_at   &lt;chr&gt; "", "", "2016-09-22 16:56:03 UTC", "", "", ...
-## $ purchased_statement_at  &lt;chr&gt; "", "", "", "", "", "", "", "", "", "", "",...
-## $ gender                  &lt;chr&gt; "Unknown", "male", "Unknown", "Unknown", "U...
-## $ country                 &lt;chr&gt; "Unknown", "PE", "Unknown", "Unknown", "Unk...
-## $ age_range               &lt;chr&gt; "Unknown", "46-55", "Unknown", "Unknown", "...
-## $ highest_education_level &lt;chr&gt; "Unknown", "university_degree", "Unknown", ...
-## $ employment_status       &lt;chr&gt; "Unknown", "working_part_time", "Unknown", ...
-## $ employment_area         &lt;chr&gt; "Unknown", "teaching_and_education", "Unkno...
-## $ detected_country        &lt;chr&gt; "GB", "PE", "NG", "UG", "IM", "NO", "GB", "...
-## $ survey                  &lt;dbl&gt; 1, 1, 1, 1, 1, 1, 1, 1, 1, 1, 1, 1, 1, 1, 1...
-## $ year                    &lt;chr&gt; "2016", "2016", "2016", "2016", "2016", "20...</a:t>
+              <a:rPr/>
+              <a:t>Pre-processing</a:t>
+            </a:r>
+          </a:p>
+        </p:txBody>
+      </p:sp>
+    </p:spTree>
+  </p:cSld>
+</p:sld>
+</file>
+
+<file path=ppt/slides/slide7.xml><?xml version="1.0" encoding="utf-8"?>
+<p:sld xmlns:a="http://schemas.openxmlformats.org/drawingml/2006/main" xmlns:r="http://schemas.openxmlformats.org/officeDocument/2006/relationships" xmlns:p="http://schemas.openxmlformats.org/presentationml/2006/main">
+  <p:cSld>
+    <p:spTree>
+      <p:nvGrpSpPr>
+        <p:cNvPr id="1" name=""/>
+        <p:cNvGrpSpPr/>
+        <p:nvPr/>
+      </p:nvGrpSpPr>
+      <p:grpSpPr>
+        <a:xfrm>
+          <a:off x="0" y="0"/>
+          <a:ext cx="0" cy="0"/>
+          <a:chOff x="0" y="0"/>
+          <a:chExt cx="0" cy="0"/>
+        </a:xfrm>
+      </p:grpSpPr>
+      <p:sp>
+        <p:nvSpPr>
+          <p:cNvPr id="2" name="Title 1"/>
+          <p:cNvSpPr>
+            <a:spLocks noGrp="1"/>
+          </p:cNvSpPr>
+          <p:nvPr>
+            <p:ph type="title"/>
+          </p:nvPr>
+        </p:nvSpPr>
+        <p:spPr/>
+        <p:txBody>
+          <a:bodyPr/>
+          <a:lstStyle/>
+          <a:p>
+            <a:pPr lvl="0" marL="0" indent="0">
+              <a:buNone/>
+            </a:pPr>
+            <a:r>
+              <a:rPr/>
+              <a:t>Syncing</a:t>
+            </a:r>
+            <a:r>
+              <a:rPr/>
+              <a:t> </a:t>
+            </a:r>
+            <a:r>
+              <a:rPr/>
+              <a:t>GitHub</a:t>
+            </a:r>
+            <a:r>
+              <a:rPr/>
+              <a:t> </a:t>
+            </a:r>
+            <a:r>
+              <a:rPr/>
+              <a:t>and</a:t>
+            </a:r>
+            <a:r>
+              <a:rPr/>
+              <a:t> </a:t>
+            </a:r>
+            <a:r>
+              <a:rPr/>
+              <a:t>using</a:t>
+            </a:r>
+            <a:r>
+              <a:rPr/>
+              <a:t> </a:t>
+            </a:r>
+            <a:r>
+              <a:rPr/>
+              <a:t>Git</a:t>
+            </a:r>
+            <a:r>
+              <a:rPr/>
+              <a:t> </a:t>
+            </a:r>
+            <a:r>
+              <a:rPr/>
+              <a:t>for</a:t>
+            </a:r>
+            <a:r>
+              <a:rPr/>
+              <a:t> </a:t>
+            </a:r>
+            <a:r>
+              <a:rPr/>
+              <a:t>Commit</a:t>
+            </a:r>
+          </a:p>
+        </p:txBody>
+      </p:sp>
+    </p:spTree>
+  </p:cSld>
+</p:sld>
+</file>
+
+<file path=ppt/slides/slide8.xml><?xml version="1.0" encoding="utf-8"?>
+<p:sld xmlns:a="http://schemas.openxmlformats.org/drawingml/2006/main" xmlns:r="http://schemas.openxmlformats.org/officeDocument/2006/relationships" xmlns:p="http://schemas.openxmlformats.org/presentationml/2006/main">
+  <p:cSld>
+    <p:spTree>
+      <p:nvGrpSpPr>
+        <p:cNvPr id="1" name=""/>
+        <p:cNvGrpSpPr/>
+        <p:nvPr/>
+      </p:nvGrpSpPr>
+      <p:grpSpPr>
+        <a:xfrm>
+          <a:off x="0" y="0"/>
+          <a:ext cx="0" cy="0"/>
+          <a:chOff x="0" y="0"/>
+          <a:chExt cx="0" cy="0"/>
+        </a:xfrm>
+      </p:grpSpPr>
+      <p:sp>
+        <p:nvSpPr>
+          <p:cNvPr id="2" name="Title 1"/>
+          <p:cNvSpPr>
+            <a:spLocks noGrp="1"/>
+          </p:cNvSpPr>
+          <p:nvPr>
+            <p:ph type="title"/>
+          </p:nvPr>
+        </p:nvSpPr>
+        <p:spPr/>
+        <p:txBody>
+          <a:bodyPr/>
+          <a:lstStyle/>
+          <a:p>
+            <a:pPr lvl="0" marL="0" indent="0">
+              <a:buNone/>
+            </a:pPr>
+            <a:r>
+              <a:rPr/>
+              <a:t>Producing</a:t>
+            </a:r>
+            <a:r>
+              <a:rPr/>
+              <a:t> </a:t>
+            </a:r>
+            <a:r>
+              <a:rPr/>
+              <a:t>graphs</a:t>
+            </a:r>
+            <a:r>
+              <a:rPr/>
+              <a:t> </a:t>
+            </a:r>
+            <a:r>
+              <a:rPr/>
+              <a:t>and</a:t>
+            </a:r>
+            <a:r>
+              <a:rPr/>
+              <a:t> </a:t>
+            </a:r>
+            <a:r>
+              <a:rPr/>
+              <a:t>tables</a:t>
+            </a:r>
+          </a:p>
+        </p:txBody>
+      </p:sp>
+    </p:spTree>
+  </p:cSld>
+</p:sld>
+</file>
+
+<file path=ppt/slides/slide9.xml><?xml version="1.0" encoding="utf-8"?>
+<p:sld xmlns:a="http://schemas.openxmlformats.org/drawingml/2006/main" xmlns:r="http://schemas.openxmlformats.org/officeDocument/2006/relationships" xmlns:p="http://schemas.openxmlformats.org/presentationml/2006/main">
+  <p:cSld>
+    <p:spTree>
+      <p:nvGrpSpPr>
+        <p:cNvPr id="1" name=""/>
+        <p:cNvGrpSpPr/>
+        <p:nvPr/>
+      </p:nvGrpSpPr>
+      <p:grpSpPr>
+        <a:xfrm>
+          <a:off x="0" y="0"/>
+          <a:ext cx="0" cy="0"/>
+          <a:chOff x="0" y="0"/>
+          <a:chExt cx="0" cy="0"/>
+        </a:xfrm>
+      </p:grpSpPr>
+      <p:sp>
+        <p:nvSpPr>
+          <p:cNvPr id="2" name="Title 1"/>
+          <p:cNvSpPr>
+            <a:spLocks noGrp="1"/>
+          </p:cNvSpPr>
+          <p:nvPr>
+            <p:ph type="title"/>
+          </p:nvPr>
+        </p:nvSpPr>
+        <p:spPr/>
+        <p:txBody>
+          <a:bodyPr/>
+          <a:lstStyle/>
+          <a:p>
+            <a:pPr lvl="0" marL="0" indent="0">
+              <a:buNone/>
+            </a:pPr>
+            <a:r>
+              <a:rPr/>
+              <a:t>Loading</a:t>
+            </a:r>
+            <a:r>
+              <a:rPr/>
+              <a:t> </a:t>
+            </a:r>
+            <a:r>
+              <a:rPr/>
+              <a:t>into</a:t>
+            </a:r>
+            <a:r>
+              <a:rPr/>
+              <a:t> </a:t>
+            </a:r>
+            <a:r>
+              <a:rPr/>
+              <a:t>an</a:t>
+            </a:r>
+            <a:r>
+              <a:rPr/>
+              <a:t> </a:t>
+            </a:r>
+            <a:r>
+              <a:rPr/>
+              <a:t>RMarkdown</a:t>
+            </a:r>
+            <a:r>
+              <a:rPr/>
+              <a:t> </a:t>
+            </a:r>
+            <a:r>
+              <a:rPr/>
+              <a:t>report</a:t>
             </a:r>
           </a:p>
         </p:txBody>
@@ -4231,7 +4884,7 @@
   <a:extraClrSchemeLst/>
   <a:extLst>
     <a:ext uri="{05A4C25C-085E-4340-85A3-A5531E510DB2}">
-      <thm15:themeFamily xmlns:thm15="http://schemas.microsoft.com/office/thememl/2012/main" name="Presentation16" id="{3BD89E14-AE4B-4FC3-BEF8-219B3A84BAED}" vid="{95E51AE6-DC9B-485F-80CC-DEFABBA3B85C}"/>
+      <thm15:themeFamily xmlns:thm15="http://schemas.microsoft.com/office/thememl/2012/main" name="Presentation18" id="{B5C1D7B2-B362-4EED-81A7-DAF0D0099013}" vid="{5D4D384F-96C2-485E-B2E6-A5B016A80A9A}"/>
     </a:ext>
   </a:extLst>
 </a:theme>

</xml_diff>

<commit_message>
Test GitLog file generation, tidy up of README files
</commit_message>
<xml_diff>
--- a/Exploratory_Analysis/reports/Overview-Presentation.pptx
+++ b/Exploratory_Analysis/reports/Overview-Presentation.pptx
@@ -827,7 +827,7 @@
           </a:lstStyle>
           <a:p>
             <a:r>
-              <a:rPr lang="en-US" smtClean="0"/>
+              <a:rPr lang="en-US" dirty="0" smtClean="0"/>
               <a:t>Click to edit Master subtitle style</a:t>
             </a:r>
             <a:endParaRPr lang="en-US" dirty="0"/>
@@ -844,16 +844,33 @@
             <p:ph type="dt" sz="half" idx="10"/>
           </p:nvPr>
         </p:nvSpPr>
-        <p:spPr/>
+        <p:spPr>
+          <a:xfrm>
+            <a:off x="7205133" y="6041362"/>
+            <a:ext cx="2126193" cy="383249"/>
+          </a:xfrm>
+        </p:spPr>
         <p:txBody>
           <a:bodyPr/>
-          <a:lstStyle/>
+          <a:lstStyle>
+            <a:lvl1pPr>
+              <a:defRPr lang="en-GB" sz="1600" kern="1200" smtClean="0">
+                <a:solidFill>
+                  <a:schemeClr val="tx1"/>
+                </a:solidFill>
+                <a:latin typeface="+mn-lt"/>
+                <a:ea typeface="+mn-ea"/>
+                <a:cs typeface="+mn-cs"/>
+              </a:defRPr>
+            </a:lvl1pPr>
+          </a:lstStyle>
           <a:p>
             <a:fld id="{0FA3285A-3BF8-4E93-8A4F-3C436A480EC2}" type="datetimeFigureOut">
               <a:rPr lang="en-GB" smtClean="0"/>
-              <a:t>01/12/2020</a:t>
+              <a:pPr/>
+              <a:t>02/12/2020</a:t>
             </a:fld>
-            <a:endParaRPr lang="en-GB"/>
+            <a:endParaRPr lang="en-GB" dirty="0"/>
           </a:p>
         </p:txBody>
       </p:sp>
@@ -1445,7 +1462,7 @@
           <a:p>
             <a:fld id="{0FA3285A-3BF8-4E93-8A4F-3C436A480EC2}" type="datetimeFigureOut">
               <a:rPr lang="en-GB" smtClean="0"/>
-              <a:t>01/12/2020</a:t>
+              <a:t>02/12/2020</a:t>
             </a:fld>
             <a:endParaRPr lang="en-GB"/>
           </a:p>
@@ -1954,7 +1971,7 @@
           <a:p>
             <a:fld id="{0FA3285A-3BF8-4E93-8A4F-3C436A480EC2}" type="datetimeFigureOut">
               <a:rPr lang="en-GB" smtClean="0"/>
-              <a:t>01/12/2020</a:t>
+              <a:t>02/12/2020</a:t>
             </a:fld>
             <a:endParaRPr lang="en-GB"/>
           </a:p>
@@ -4150,7 +4167,7 @@
           <a:p>
             <a:fld id="{0FA3285A-3BF8-4E93-8A4F-3C436A480EC2}" type="datetimeFigureOut">
               <a:rPr lang="en-GB" smtClean="0"/>
-              <a:t>01/12/2020</a:t>
+              <a:t>02/12/2020</a:t>
             </a:fld>
             <a:endParaRPr lang="en-GB"/>
           </a:p>
@@ -4805,7 +4822,12 @@
             <p:ph type="dt" sz="half" idx="10"/>
           </p:nvPr>
         </p:nvSpPr>
-        <p:spPr/>
+        <p:spPr>
+          <a:xfrm>
+            <a:off x="7205133" y="6041362"/>
+            <a:ext cx="2126193" cy="383249"/>
+          </a:xfrm>
+        </p:spPr>
         <p:txBody>
           <a:bodyPr/>
           <a:lstStyle/>
@@ -9737,7 +9759,7 @@
   <a:extraClrSchemeLst/>
   <a:extLst>
     <a:ext uri="{05A4C25C-085E-4340-85A3-A5531E510DB2}">
-      <thm15:themeFamily xmlns:thm15="http://schemas.microsoft.com/office/thememl/2012/main" name="Presentation2" id="{08171A18-583A-4469-BF11-F83FF0163632}" vid="{A4A7555C-ED24-4293-9CDA-7BF206975572}"/>
+      <thm15:themeFamily xmlns:thm15="http://schemas.microsoft.com/office/thememl/2012/main" name="Presentation1" id="{F1766F1C-2B2A-484F-806A-7BC2D9621E75}" vid="{8667D80C-8F4E-4E3F-98DB-51D45D83FE80}"/>
     </a:ext>
   </a:extLst>
 </a:theme>

</xml_diff>

<commit_message>
Removing unused .png versions of graphs
</commit_message>
<xml_diff>
--- a/Exploratory_Analysis/reports/Overview-Presentation.pptx
+++ b/Exploratory_Analysis/reports/Overview-Presentation.pptx
@@ -20,7 +20,6 @@
     <p:sldId id="268" r:id="rId14"/>
     <p:sldId id="269" r:id="rId15"/>
     <p:sldId id="270" r:id="rId16"/>
-    <p:sldId id="271" r:id="rId17"/>
   </p:sldIdLst>
   <p:sldSz cx="12192000" cy="6858000"/>
   <p:notesSz cx="6858000" cy="9144000"/>
@@ -5283,23 +5282,23 @@
             </a:pPr>
             <a:r>
               <a:rPr/>
-              <a:t>Evaluation</a:t>
-            </a:r>
-            <a:r>
-              <a:rPr/>
-              <a:t> </a:t>
-            </a:r>
-            <a:r>
-              <a:rPr/>
-              <a:t>(using</a:t>
-            </a:r>
-            <a:r>
-              <a:rPr/>
-              <a:t> </a:t>
-            </a:r>
-            <a:r>
-              <a:rPr/>
-              <a:t>counts)</a:t>
+              <a:t>Modelling</a:t>
+            </a:r>
+            <a:r>
+              <a:rPr/>
+              <a:t> </a:t>
+            </a:r>
+            <a:r>
+              <a:rPr/>
+              <a:t>-</a:t>
+            </a:r>
+            <a:r>
+              <a:rPr/>
+              <a:t> </a:t>
+            </a:r>
+            <a:r>
+              <a:rPr/>
+              <a:t>tables</a:t>
             </a:r>
           </a:p>
         </p:txBody>
@@ -5768,53 +5767,6 @@
       </p:grpSpPr>
       <p:sp>
         <p:nvSpPr>
-          <p:cNvPr id="3" name="Content Placeholder 2"/>
-          <p:cNvSpPr>
-            <a:spLocks noGrp="1"/>
-          </p:cNvSpPr>
-          <p:nvPr>
-            <p:ph idx="1"/>
-          </p:nvPr>
-        </p:nvSpPr>
-        <p:spPr/>
-        <p:txBody>
-          <a:bodyPr/>
-          <a:lstStyle/>
-          <a:p>
-            <a:pPr lvl="0" marL="0" indent="0">
-              <a:buNone/>
-            </a:pPr>
-            <a:r>
-              <a:rPr/>
-              <a:t>ls</a:t>
-            </a:r>
-          </a:p>
-        </p:txBody>
-      </p:sp>
-    </p:spTree>
-  </p:cSld>
-</p:sld>
-</file>
-
-<file path=ppt/slides/slide14.xml><?xml version="1.0" encoding="utf-8"?>
-<p:sld xmlns:a="http://schemas.openxmlformats.org/drawingml/2006/main" xmlns:r="http://schemas.openxmlformats.org/officeDocument/2006/relationships" xmlns:p="http://schemas.openxmlformats.org/presentationml/2006/main">
-  <p:cSld>
-    <p:spTree>
-      <p:nvGrpSpPr>
-        <p:cNvPr id="1" name=""/>
-        <p:cNvGrpSpPr/>
-        <p:nvPr/>
-      </p:nvGrpSpPr>
-      <p:grpSpPr>
-        <a:xfrm>
-          <a:off x="0" y="0"/>
-          <a:ext cx="0" cy="0"/>
-          <a:chOff x="0" y="0"/>
-          <a:chExt cx="0" cy="0"/>
-        </a:xfrm>
-      </p:grpSpPr>
-      <p:sp>
-        <p:nvSpPr>
           <p:cNvPr id="2" name="Title 1"/>
           <p:cNvSpPr>
             <a:spLocks noGrp="1"/>
@@ -5838,7 +5790,23 @@
             </a:pPr>
             <a:r>
               <a:rPr/>
-              <a:t>Enrolments</a:t>
+              <a:t>Evaluation</a:t>
+            </a:r>
+            <a:r>
+              <a:rPr/>
+              <a:t> </a:t>
+            </a:r>
+            <a:r>
+              <a:rPr/>
+              <a:t>-</a:t>
+            </a:r>
+            <a:r>
+              <a:rPr/>
+              <a:t> </a:t>
+            </a:r>
+            <a:r>
+              <a:rPr/>
+              <a:t>enrolments</a:t>
             </a:r>
           </a:p>
         </p:txBody>
@@ -6012,7 +5980,7 @@
 </p:sld>
 </file>
 
-<file path=ppt/slides/slide15.xml><?xml version="1.0" encoding="utf-8"?>
+<file path=ppt/slides/slide14.xml><?xml version="1.0" encoding="utf-8"?>
 <p:sld xmlns:a="http://schemas.openxmlformats.org/drawingml/2006/main" xmlns:r="http://schemas.openxmlformats.org/officeDocument/2006/relationships" xmlns:p="http://schemas.openxmlformats.org/presentationml/2006/main">
   <p:cSld>
     <p:spTree>
@@ -6054,7 +6022,23 @@
             </a:pPr>
             <a:r>
               <a:rPr/>
-              <a:t>Details</a:t>
+              <a:t>Evalation</a:t>
+            </a:r>
+            <a:r>
+              <a:rPr/>
+              <a:t> </a:t>
+            </a:r>
+            <a:r>
+              <a:rPr/>
+              <a:t>-</a:t>
+            </a:r>
+            <a:r>
+              <a:rPr/>
+              <a:t> </a:t>
+            </a:r>
+            <a:r>
+              <a:rPr/>
+              <a:t>details</a:t>
             </a:r>
             <a:r>
               <a:rPr/>
@@ -6063,22 +6047,6 @@
             <a:r>
               <a:rPr/>
               <a:t>shared</a:t>
-            </a:r>
-            <a:r>
-              <a:rPr/>
-              <a:t> </a:t>
-            </a:r>
-            <a:r>
-              <a:rPr/>
-              <a:t>over</a:t>
-            </a:r>
-            <a:r>
-              <a:rPr/>
-              <a:t> </a:t>
-            </a:r>
-            <a:r>
-              <a:rPr/>
-              <a:t>time</a:t>
             </a:r>
           </a:p>
         </p:txBody>
@@ -6316,7 +6284,7 @@
 </p:sld>
 </file>
 
-<file path=ppt/slides/slide16.xml><?xml version="1.0" encoding="utf-8"?>
+<file path=ppt/slides/slide15.xml><?xml version="1.0" encoding="utf-8"?>
 <p:sld xmlns:a="http://schemas.openxmlformats.org/drawingml/2006/main" xmlns:r="http://schemas.openxmlformats.org/officeDocument/2006/relationships" xmlns:p="http://schemas.openxmlformats.org/presentationml/2006/main">
   <p:cSld>
     <p:spTree>
@@ -6416,6 +6384,15 @@
             <a:r>
               <a:rPr/>
               <a:t>I used the RMarkdown file to generate a report to be stored in the Reports section of the project file structure. During the generation of graphs and tables I returned to the data preparation phase frequently. Regularly, I would update the Git version control by using a Commit and Push commands.</a:t>
+            </a:r>
+          </a:p>
+          <a:p>
+            <a:pPr lvl="0" marL="0" indent="0">
+              <a:buNone/>
+            </a:pPr>
+            <a:r>
+              <a:rPr/>
+              <a:t>I spent a far amount of time ‘mopping up’ and making sure code had comments for explanation of the steps and the reasons. Also I added to the README documents and checked contents of all the ProjectTemplate folders.</a:t>
             </a:r>
           </a:p>
         </p:txBody>

</xml_diff>